<commit_message>
Medizin v2.0 - Fix typos
</commit_message>
<xml_diff>
--- a/pptx/Medizin.pptx
+++ b/pptx/Medizin.pptx
@@ -215,7 +215,7 @@
           <a:p>
             <a:fld id="{67F39FB1-7FBC-4822-9443-8594B71ABEA7}" type="datetimeFigureOut">
               <a:rPr lang="de-DE" smtClean="0"/>
-              <a:t>26.07.2021</a:t>
+              <a:t>27.07.2021</a:t>
             </a:fld>
             <a:endParaRPr lang="de-DE"/>
           </a:p>
@@ -380,7 +380,7 @@
           <a:p>
             <a:fld id="{B6905721-92E2-4CFE-876B-2994F9CCFDA5}" type="datetimeFigureOut">
               <a:rPr lang="de-DE" smtClean="0"/>
-              <a:t>26.07.2021</a:t>
+              <a:t>27.07.2021</a:t>
             </a:fld>
             <a:endParaRPr lang="de-DE"/>
           </a:p>
@@ -6868,15 +6868,7 @@
             </a:r>
             <a:r>
               <a:rPr lang="de-DE" sz="600" dirty="0"/>
-              <a:t>(Indikation </a:t>
-            </a:r>
-            <a:r>
-              <a:rPr lang="de-DE" sz="600" dirty="0" err="1"/>
-              <a:t>Beckimmo</a:t>
-            </a:r>
-            <a:r>
-              <a:rPr lang="de-DE" sz="600" dirty="0"/>
-              <a:t>.)</a:t>
+              <a:t>(Indikation Beckenimmobilisation)</a:t>
             </a:r>
             <a:endParaRPr lang="de-DE" sz="600" b="1" dirty="0"/>
           </a:p>
@@ -6970,7 +6962,7 @@
             </a:r>
             <a:r>
               <a:rPr lang="de-DE" sz="600" dirty="0"/>
-              <a:t>alance</a:t>
+              <a:t>alance	Gleichgewichtsstörung</a:t>
             </a:r>
             <a:br>
               <a:rPr lang="de-DE" sz="600" dirty="0"/>
@@ -6981,7 +6973,7 @@
             </a:r>
             <a:r>
               <a:rPr lang="de-DE" sz="600" dirty="0"/>
-              <a:t>yes</a:t>
+              <a:t>yes		Sehstörungen</a:t>
             </a:r>
             <a:br>
               <a:rPr lang="de-DE" sz="600" dirty="0"/>
@@ -6992,7 +6984,7 @@
             </a:r>
             <a:r>
               <a:rPr lang="de-DE" sz="600" dirty="0"/>
-              <a:t>ace</a:t>
+              <a:t>ace		Gesichtsasymmetrien</a:t>
             </a:r>
             <a:br>
               <a:rPr lang="de-DE" sz="600" dirty="0"/>
@@ -7003,7 +6995,7 @@
             </a:r>
             <a:r>
               <a:rPr lang="de-DE" sz="600" dirty="0"/>
-              <a:t>rms </a:t>
+              <a:t>rms 	Schwäche, Missempfinden</a:t>
             </a:r>
             <a:br>
               <a:rPr lang="de-DE" sz="600" dirty="0"/>
@@ -7014,7 +7006,7 @@
             </a:r>
             <a:r>
               <a:rPr lang="de-DE" sz="600" dirty="0"/>
-              <a:t>peech</a:t>
+              <a:t>peech	Sprachstörungen</a:t>
             </a:r>
             <a:br>
               <a:rPr lang="de-DE" sz="600" dirty="0"/>
@@ -7025,7 +7017,7 @@
             </a:r>
             <a:r>
               <a:rPr lang="de-DE" sz="600" dirty="0"/>
-              <a:t>ime</a:t>
+              <a:t>ime		Seit wann? Zeitkritisch!</a:t>
             </a:r>
           </a:p>
         </p:txBody>
@@ -8424,6 +8416,55 @@
               <a:t>Zusammenfassung durch Empfänger</a:t>
             </a:r>
             <a:endParaRPr lang="de-DE" sz="700" b="1" dirty="0"/>
+          </a:p>
+        </p:txBody>
+      </p:sp>
+      <p:sp>
+        <p:nvSpPr>
+          <p:cNvPr id="5" name="Rechteck 4">
+            <a:extLst>
+              <a:ext uri="{FF2B5EF4-FFF2-40B4-BE49-F238E27FC236}">
+                <a16:creationId xmlns:a16="http://schemas.microsoft.com/office/drawing/2014/main" id="{7E960041-2298-485F-9AB3-8F7F594014EC}"/>
+              </a:ext>
+            </a:extLst>
+          </p:cNvPr>
+          <p:cNvSpPr/>
+          <p:nvPr/>
+        </p:nvSpPr>
+        <p:spPr>
+          <a:xfrm>
+            <a:off x="-387" y="2298608"/>
+            <a:ext cx="1980000" cy="36000"/>
+          </a:xfrm>
+          <a:prstGeom prst="rect">
+            <a:avLst/>
+          </a:prstGeom>
+          <a:ln>
+            <a:noFill/>
+          </a:ln>
+        </p:spPr>
+        <p:style>
+          <a:lnRef idx="2">
+            <a:schemeClr val="accent2">
+              <a:shade val="50000"/>
+            </a:schemeClr>
+          </a:lnRef>
+          <a:fillRef idx="1">
+            <a:schemeClr val="accent2"/>
+          </a:fillRef>
+          <a:effectRef idx="0">
+            <a:schemeClr val="accent2"/>
+          </a:effectRef>
+          <a:fontRef idx="minor">
+            <a:schemeClr val="lt1"/>
+          </a:fontRef>
+        </p:style>
+        <p:txBody>
+          <a:bodyPr rtlCol="0" anchor="ctr"/>
+          <a:lstStyle/>
+          <a:p>
+            <a:pPr algn="ctr"/>
+            <a:endParaRPr lang="de-DE"/>
           </a:p>
         </p:txBody>
       </p:sp>

</xml_diff>

<commit_message>
Finales Design mit Zeichen nach DV102
</commit_message>
<xml_diff>
--- a/pptx/Medizin.pptx
+++ b/pptx/Medizin.pptx
@@ -753,7 +753,7 @@
 </file>
 
 <file path=ppt/slideMasters/slideMaster1.xml><?xml version="1.0" encoding="utf-8"?>
-<p:sldMaster xmlns:a="http://schemas.openxmlformats.org/drawingml/2006/main" xmlns:r="http://schemas.openxmlformats.org/officeDocument/2006/relationships" xmlns:p="http://schemas.openxmlformats.org/presentationml/2006/main">
+<p:sldMaster xmlns:a="http://schemas.openxmlformats.org/drawingml/2006/main" xmlns:r="http://schemas.openxmlformats.org/officeDocument/2006/relationships" xmlns:p="http://schemas.openxmlformats.org/presentationml/2006/main" preserve="1">
   <p:cSld>
     <p:bg>
       <p:bgRef idx="1001">
@@ -1329,7 +1329,7 @@
       </p:sp>
       <p:sp>
         <p:nvSpPr>
-          <p:cNvPr id="5" name="Kreuz 4">
+          <p:cNvPr id="5" name="Rechteck 4">
             <a:extLst>
               <a:ext uri="{FF2B5EF4-FFF2-40B4-BE49-F238E27FC236}">
                 <a16:creationId xmlns:a16="http://schemas.microsoft.com/office/drawing/2014/main" id="{0CB6007F-6AFB-4F1D-B1D2-C98A66675634}"/>
@@ -1344,10 +1344,8 @@
             <a:off x="1619611" y="72000"/>
             <a:ext cx="288000" cy="288000"/>
           </a:xfrm>
-          <a:prstGeom prst="plus">
-            <a:avLst>
-              <a:gd name="adj" fmla="val 31902"/>
-            </a:avLst>
+          <a:prstGeom prst="rect">
+            <a:avLst/>
           </a:prstGeom>
           <a:solidFill>
             <a:schemeClr val="bg1"/>
@@ -1381,6 +1379,96 @@
           </a:p>
         </p:txBody>
       </p:sp>
+      <p:cxnSp>
+        <p:nvCxnSpPr>
+          <p:cNvPr id="8" name="Gerader Verbinder 7">
+            <a:extLst>
+              <a:ext uri="{FF2B5EF4-FFF2-40B4-BE49-F238E27FC236}">
+                <a16:creationId xmlns:a16="http://schemas.microsoft.com/office/drawing/2014/main" id="{555CA12E-C6F1-48C4-A2E0-38700DB540C2}"/>
+              </a:ext>
+            </a:extLst>
+          </p:cNvPr>
+          <p:cNvCxnSpPr>
+            <a:cxnSpLocks/>
+            <a:stCxn id="5" idx="0"/>
+            <a:endCxn id="5" idx="2"/>
+          </p:cNvCxnSpPr>
+          <p:nvPr userDrawn="1"/>
+        </p:nvCxnSpPr>
+        <p:spPr>
+          <a:xfrm>
+            <a:off x="1763611" y="72000"/>
+            <a:ext cx="0" cy="288000"/>
+          </a:xfrm>
+          <a:prstGeom prst="line">
+            <a:avLst/>
+          </a:prstGeom>
+          <a:ln w="12700">
+            <a:solidFill>
+              <a:schemeClr val="tx1"/>
+            </a:solidFill>
+          </a:ln>
+        </p:spPr>
+        <p:style>
+          <a:lnRef idx="1">
+            <a:schemeClr val="accent1"/>
+          </a:lnRef>
+          <a:fillRef idx="0">
+            <a:schemeClr val="accent1"/>
+          </a:fillRef>
+          <a:effectRef idx="0">
+            <a:schemeClr val="accent1"/>
+          </a:effectRef>
+          <a:fontRef idx="minor">
+            <a:schemeClr val="tx1"/>
+          </a:fontRef>
+        </p:style>
+      </p:cxnSp>
+      <p:cxnSp>
+        <p:nvCxnSpPr>
+          <p:cNvPr id="17" name="Gerader Verbinder 16">
+            <a:extLst>
+              <a:ext uri="{FF2B5EF4-FFF2-40B4-BE49-F238E27FC236}">
+                <a16:creationId xmlns:a16="http://schemas.microsoft.com/office/drawing/2014/main" id="{6A7D29C0-B8BD-43F5-9D72-A6D9D609D98D}"/>
+              </a:ext>
+            </a:extLst>
+          </p:cNvPr>
+          <p:cNvCxnSpPr>
+            <a:cxnSpLocks/>
+            <a:stCxn id="5" idx="3"/>
+            <a:endCxn id="5" idx="1"/>
+          </p:cNvCxnSpPr>
+          <p:nvPr userDrawn="1"/>
+        </p:nvCxnSpPr>
+        <p:spPr>
+          <a:xfrm flipH="1">
+            <a:off x="1619611" y="216000"/>
+            <a:ext cx="288000" cy="0"/>
+          </a:xfrm>
+          <a:prstGeom prst="line">
+            <a:avLst/>
+          </a:prstGeom>
+          <a:ln w="12700">
+            <a:solidFill>
+              <a:schemeClr val="tx1"/>
+            </a:solidFill>
+          </a:ln>
+        </p:spPr>
+        <p:style>
+          <a:lnRef idx="1">
+            <a:schemeClr val="accent1"/>
+          </a:lnRef>
+          <a:fillRef idx="0">
+            <a:schemeClr val="accent1"/>
+          </a:fillRef>
+          <a:effectRef idx="0">
+            <a:schemeClr val="accent1"/>
+          </a:effectRef>
+          <a:fontRef idx="minor">
+            <a:schemeClr val="tx1"/>
+          </a:fontRef>
+        </p:style>
+      </p:cxnSp>
     </p:spTree>
     <p:extLst>
       <p:ext uri="{BB962C8B-B14F-4D97-AF65-F5344CB8AC3E}">
@@ -10042,7 +10130,7 @@
 </file>
 
 <file path=ppt/theme/theme1.xml><?xml version="1.0" encoding="utf-8"?>
-<a:theme xmlns:a="http://schemas.openxmlformats.org/drawingml/2006/main" name="Office">
+<a:theme xmlns:a="http://schemas.openxmlformats.org/drawingml/2006/main" name="Medizin">
   <a:themeElements>
     <a:clrScheme name="Taschenkarten">
       <a:dk1>

</xml_diff>